<commit_message>
Update Identifying Sensitive Content.pptx
</commit_message>
<xml_diff>
--- a/Identifying Sensitive Content.pptx
+++ b/Identifying Sensitive Content.pptx
@@ -261,12 +261,12 @@
   <p:extLst>
     <p:ext uri="{EFAFB233-063F-42B5-8137-9DF3F51BA10A}">
       <p15:sldGuideLst>
-        <p15:guide id="1" orient="horz" pos="1620">
+        <p15:guide id="1" orient="horz" pos="726">
           <p15:clr>
             <a:srgbClr val="A4A3A4"/>
           </p15:clr>
         </p15:guide>
-        <p15:guide id="2" pos="2880">
+        <p15:guide id="2" pos="196">
           <p15:clr>
             <a:srgbClr val="A4A3A4"/>
           </p15:clr>
@@ -708,7 +708,7 @@
   <p:cSld>
     <p:spTree>
       <p:nvGrpSpPr>
-        <p:cNvPr id="55" name="Shape 55"/>
+        <p:cNvPr id="56" name="Shape 56"/>
         <p:cNvGrpSpPr/>
         <p:nvPr/>
       </p:nvGrpSpPr>
@@ -722,7 +722,7 @@
       </p:grpSpPr>
       <p:sp>
         <p:nvSpPr>
-          <p:cNvPr id="56" name="Google Shape;56;p:notes"/>
+          <p:cNvPr id="57" name="Google Shape;57;p:notes"/>
           <p:cNvSpPr/>
           <p:nvPr>
             <p:ph idx="2" type="sldImg"/>
@@ -757,7 +757,7 @@
       </p:sp>
       <p:sp>
         <p:nvSpPr>
-          <p:cNvPr id="57" name="Google Shape;57;p:notes"/>
+          <p:cNvPr id="58" name="Google Shape;58;p:notes"/>
           <p:cNvSpPr txBox="1"/>
           <p:nvPr>
             <p:ph idx="1" type="body"/>
@@ -807,7 +807,7 @@
   <p:cSld>
     <p:spTree>
       <p:nvGrpSpPr>
-        <p:cNvPr id="61" name="Shape 61"/>
+        <p:cNvPr id="62" name="Shape 62"/>
         <p:cNvGrpSpPr/>
         <p:nvPr/>
       </p:nvGrpSpPr>
@@ -821,7 +821,7 @@
       </p:grpSpPr>
       <p:sp>
         <p:nvSpPr>
-          <p:cNvPr id="62" name="Google Shape;62;g130ce0486ea_1_0:notes"/>
+          <p:cNvPr id="63" name="Google Shape;63;g130ce0486ea_1_0:notes"/>
           <p:cNvSpPr/>
           <p:nvPr>
             <p:ph idx="2" type="sldImg"/>
@@ -856,7 +856,7 @@
       </p:sp>
       <p:sp>
         <p:nvSpPr>
-          <p:cNvPr id="63" name="Google Shape;63;g130ce0486ea_1_0:notes"/>
+          <p:cNvPr id="64" name="Google Shape;64;g130ce0486ea_1_0:notes"/>
           <p:cNvSpPr txBox="1"/>
           <p:nvPr>
             <p:ph idx="1" type="body"/>
@@ -906,7 +906,7 @@
   <p:cSld>
     <p:spTree>
       <p:nvGrpSpPr>
-        <p:cNvPr id="71" name="Shape 71"/>
+        <p:cNvPr id="72" name="Shape 72"/>
         <p:cNvGrpSpPr/>
         <p:nvPr/>
       </p:nvGrpSpPr>
@@ -920,7 +920,7 @@
       </p:grpSpPr>
       <p:sp>
         <p:nvSpPr>
-          <p:cNvPr id="72" name="Google Shape;72;g13a92f45b7c_0_31:notes"/>
+          <p:cNvPr id="73" name="Google Shape;73;g13a92f45b7c_0_31:notes"/>
           <p:cNvSpPr/>
           <p:nvPr>
             <p:ph idx="2" type="sldImg"/>
@@ -955,7 +955,7 @@
       </p:sp>
       <p:sp>
         <p:nvSpPr>
-          <p:cNvPr id="73" name="Google Shape;73;g13a92f45b7c_0_31:notes"/>
+          <p:cNvPr id="74" name="Google Shape;74;g13a92f45b7c_0_31:notes"/>
           <p:cNvSpPr txBox="1"/>
           <p:nvPr>
             <p:ph idx="1" type="body"/>
@@ -1005,7 +1005,7 @@
   <p:cSld>
     <p:spTree>
       <p:nvGrpSpPr>
-        <p:cNvPr id="79" name="Shape 79"/>
+        <p:cNvPr id="80" name="Shape 80"/>
         <p:cNvGrpSpPr/>
         <p:nvPr/>
       </p:nvGrpSpPr>
@@ -1019,7 +1019,7 @@
       </p:grpSpPr>
       <p:sp>
         <p:nvSpPr>
-          <p:cNvPr id="80" name="Google Shape;80;g130ce0486ea_0_661:notes"/>
+          <p:cNvPr id="81" name="Google Shape;81;g130ce0486ea_0_661:notes"/>
           <p:cNvSpPr/>
           <p:nvPr>
             <p:ph idx="2" type="sldImg"/>
@@ -1054,7 +1054,7 @@
       </p:sp>
       <p:sp>
         <p:nvSpPr>
-          <p:cNvPr id="81" name="Google Shape;81;g130ce0486ea_0_661:notes"/>
+          <p:cNvPr id="82" name="Google Shape;82;g130ce0486ea_0_661:notes"/>
           <p:cNvSpPr txBox="1"/>
           <p:nvPr>
             <p:ph idx="1" type="body"/>
@@ -1104,7 +1104,7 @@
   <p:cSld>
     <p:spTree>
       <p:nvGrpSpPr>
-        <p:cNvPr id="85" name="Shape 85"/>
+        <p:cNvPr id="86" name="Shape 86"/>
         <p:cNvGrpSpPr/>
         <p:nvPr/>
       </p:nvGrpSpPr>
@@ -1118,7 +1118,7 @@
       </p:grpSpPr>
       <p:sp>
         <p:nvSpPr>
-          <p:cNvPr id="86" name="Google Shape;86;g130ce0486ea_0_688:notes"/>
+          <p:cNvPr id="87" name="Google Shape;87;g130ce0486ea_0_688:notes"/>
           <p:cNvSpPr/>
           <p:nvPr>
             <p:ph idx="2" type="sldImg"/>
@@ -1153,7 +1153,7 @@
       </p:sp>
       <p:sp>
         <p:nvSpPr>
-          <p:cNvPr id="87" name="Google Shape;87;g130ce0486ea_0_688:notes"/>
+          <p:cNvPr id="88" name="Google Shape;88;g130ce0486ea_0_688:notes"/>
           <p:cNvSpPr txBox="1"/>
           <p:nvPr>
             <p:ph idx="1" type="body"/>
@@ -1203,7 +1203,7 @@
   <p:cSld>
     <p:spTree>
       <p:nvGrpSpPr>
-        <p:cNvPr id="91" name="Shape 91"/>
+        <p:cNvPr id="92" name="Shape 92"/>
         <p:cNvGrpSpPr/>
         <p:nvPr/>
       </p:nvGrpSpPr>
@@ -1217,7 +1217,7 @@
       </p:grpSpPr>
       <p:sp>
         <p:nvSpPr>
-          <p:cNvPr id="92" name="Google Shape;92;g130ce0486ea_0_666:notes"/>
+          <p:cNvPr id="93" name="Google Shape;93;g130ce0486ea_0_666:notes"/>
           <p:cNvSpPr/>
           <p:nvPr>
             <p:ph idx="2" type="sldImg"/>
@@ -1252,7 +1252,7 @@
       </p:sp>
       <p:sp>
         <p:nvSpPr>
-          <p:cNvPr id="93" name="Google Shape;93;g130ce0486ea_0_666:notes"/>
+          <p:cNvPr id="94" name="Google Shape;94;g130ce0486ea_0_666:notes"/>
           <p:cNvSpPr txBox="1"/>
           <p:nvPr>
             <p:ph idx="1" type="body"/>
@@ -1302,7 +1302,7 @@
   <p:cSld>
     <p:spTree>
       <p:nvGrpSpPr>
-        <p:cNvPr id="97" name="Shape 97"/>
+        <p:cNvPr id="98" name="Shape 98"/>
         <p:cNvGrpSpPr/>
         <p:nvPr/>
       </p:nvGrpSpPr>
@@ -1316,7 +1316,7 @@
       </p:grpSpPr>
       <p:sp>
         <p:nvSpPr>
-          <p:cNvPr id="98" name="Google Shape;98;g139f8cc6786_0_7:notes"/>
+          <p:cNvPr id="99" name="Google Shape;99;g139f8cc6786_0_7:notes"/>
           <p:cNvSpPr/>
           <p:nvPr>
             <p:ph idx="2" type="sldImg"/>
@@ -1351,7 +1351,7 @@
       </p:sp>
       <p:sp>
         <p:nvSpPr>
-          <p:cNvPr id="99" name="Google Shape;99;g139f8cc6786_0_7:notes"/>
+          <p:cNvPr id="100" name="Google Shape;100;g139f8cc6786_0_7:notes"/>
           <p:cNvSpPr txBox="1"/>
           <p:nvPr>
             <p:ph idx="1" type="body"/>
@@ -1401,7 +1401,7 @@
   <p:cSld>
     <p:spTree>
       <p:nvGrpSpPr>
-        <p:cNvPr id="104" name="Shape 104"/>
+        <p:cNvPr id="105" name="Shape 105"/>
         <p:cNvGrpSpPr/>
         <p:nvPr/>
       </p:nvGrpSpPr>
@@ -1415,7 +1415,7 @@
       </p:grpSpPr>
       <p:sp>
         <p:nvSpPr>
-          <p:cNvPr id="105" name="Google Shape;105;g139f8cc6786_0_39:notes"/>
+          <p:cNvPr id="106" name="Google Shape;106;g139f8cc6786_0_39:notes"/>
           <p:cNvSpPr/>
           <p:nvPr>
             <p:ph idx="2" type="sldImg"/>
@@ -1450,7 +1450,7 @@
       </p:sp>
       <p:sp>
         <p:nvSpPr>
-          <p:cNvPr id="106" name="Google Shape;106;g139f8cc6786_0_39:notes"/>
+          <p:cNvPr id="107" name="Google Shape;107;g139f8cc6786_0_39:notes"/>
           <p:cNvSpPr txBox="1"/>
           <p:nvPr>
             <p:ph idx="1" type="body"/>
@@ -1500,7 +1500,7 @@
   <p:cSld>
     <p:spTree>
       <p:nvGrpSpPr>
-        <p:cNvPr id="110" name="Shape 110"/>
+        <p:cNvPr id="111" name="Shape 111"/>
         <p:cNvGrpSpPr/>
         <p:nvPr/>
       </p:nvGrpSpPr>
@@ -1514,7 +1514,7 @@
       </p:grpSpPr>
       <p:sp>
         <p:nvSpPr>
-          <p:cNvPr id="111" name="Google Shape;111;g130ce0486ea_0_716:notes"/>
+          <p:cNvPr id="112" name="Google Shape;112;g130ce0486ea_0_716:notes"/>
           <p:cNvSpPr/>
           <p:nvPr>
             <p:ph idx="2" type="sldImg"/>
@@ -1549,7 +1549,7 @@
       </p:sp>
       <p:sp>
         <p:nvSpPr>
-          <p:cNvPr id="112" name="Google Shape;112;g130ce0486ea_0_716:notes"/>
+          <p:cNvPr id="113" name="Google Shape;113;g130ce0486ea_0_716:notes"/>
           <p:cNvSpPr txBox="1"/>
           <p:nvPr>
             <p:ph idx="1" type="body"/>
@@ -2173,7 +2173,7 @@
   <p:cSld name="BIG_NUMBER">
     <p:spTree>
       <p:nvGrpSpPr>
-        <p:cNvPr id="48" name="Shape 48"/>
+        <p:cNvPr id="49" name="Shape 49"/>
         <p:cNvGrpSpPr/>
         <p:nvPr/>
       </p:nvGrpSpPr>
@@ -2187,7 +2187,7 @@
       </p:grpSpPr>
       <p:sp>
         <p:nvSpPr>
-          <p:cNvPr id="49" name="Google Shape;49;p11"/>
+          <p:cNvPr id="50" name="Google Shape;50;p11"/>
           <p:cNvSpPr/>
           <p:nvPr/>
         </p:nvSpPr>
@@ -2230,7 +2230,7 @@
       </p:sp>
       <p:sp>
         <p:nvSpPr>
-          <p:cNvPr id="50" name="Google Shape;50;p11"/>
+          <p:cNvPr id="51" name="Google Shape;51;p11"/>
           <p:cNvSpPr txBox="1"/>
           <p:nvPr>
             <p:ph hasCustomPrompt="1" type="title"/>
@@ -2359,7 +2359,7 @@
       </p:sp>
       <p:sp>
         <p:nvSpPr>
-          <p:cNvPr id="51" name="Google Shape;51;p11"/>
+          <p:cNvPr id="52" name="Google Shape;52;p11"/>
           <p:cNvSpPr txBox="1"/>
           <p:nvPr>
             <p:ph idx="1" type="body"/>
@@ -2484,7 +2484,7 @@
       </p:sp>
       <p:sp>
         <p:nvSpPr>
-          <p:cNvPr id="52" name="Google Shape;52;p11"/>
+          <p:cNvPr id="53" name="Google Shape;53;p11"/>
           <p:cNvSpPr txBox="1"/>
           <p:nvPr>
             <p:ph idx="12" type="sldNum"/>
@@ -2572,7 +2572,7 @@
   <p:cSld name="BLANK">
     <p:spTree>
       <p:nvGrpSpPr>
-        <p:cNvPr id="53" name="Shape 53"/>
+        <p:cNvPr id="54" name="Shape 54"/>
         <p:cNvGrpSpPr/>
         <p:nvPr/>
       </p:nvGrpSpPr>
@@ -2586,7 +2586,7 @@
       </p:grpSpPr>
       <p:sp>
         <p:nvSpPr>
-          <p:cNvPr id="54" name="Google Shape;54;p12"/>
+          <p:cNvPr id="55" name="Google Shape;55;p12"/>
           <p:cNvSpPr txBox="1"/>
           <p:nvPr>
             <p:ph idx="12" type="sldNum"/>
@@ -3415,6 +3415,34 @@
           </a:p>
         </p:txBody>
       </p:sp>
+      <p:pic>
+        <p:nvPicPr>
+          <p:cNvPr id="23" name="Google Shape;23;p4"/>
+          <p:cNvPicPr preferRelativeResize="0"/>
+          <p:nvPr/>
+        </p:nvPicPr>
+        <p:blipFill>
+          <a:blip r:embed="rId2">
+            <a:alphaModFix/>
+          </a:blip>
+          <a:stretch>
+            <a:fillRect/>
+          </a:stretch>
+        </p:blipFill>
+        <p:spPr>
+          <a:xfrm>
+            <a:off x="7735475" y="4305900"/>
+            <a:ext cx="1408527" cy="704251"/>
+          </a:xfrm>
+          <a:prstGeom prst="rect">
+            <a:avLst/>
+          </a:prstGeom>
+          <a:noFill/>
+          <a:ln>
+            <a:noFill/>
+          </a:ln>
+        </p:spPr>
+      </p:pic>
     </p:spTree>
   </p:cSld>
   <p:clrMapOvr>
@@ -3428,7 +3456,7 @@
   <p:cSld name="TITLE_AND_TWO_COLUMNS">
     <p:spTree>
       <p:nvGrpSpPr>
-        <p:cNvPr id="23" name="Shape 23"/>
+        <p:cNvPr id="24" name="Shape 24"/>
         <p:cNvGrpSpPr/>
         <p:nvPr/>
       </p:nvGrpSpPr>
@@ -3442,7 +3470,7 @@
       </p:grpSpPr>
       <p:sp>
         <p:nvSpPr>
-          <p:cNvPr id="24" name="Google Shape;24;p5"/>
+          <p:cNvPr id="25" name="Google Shape;25;p5"/>
           <p:cNvSpPr txBox="1"/>
           <p:nvPr>
             <p:ph type="title"/>
@@ -3567,7 +3595,7 @@
       </p:sp>
       <p:sp>
         <p:nvSpPr>
-          <p:cNvPr id="25" name="Google Shape;25;p5"/>
+          <p:cNvPr id="26" name="Google Shape;26;p5"/>
           <p:cNvSpPr txBox="1"/>
           <p:nvPr>
             <p:ph idx="1" type="body"/>
@@ -3692,7 +3720,7 @@
       </p:sp>
       <p:sp>
         <p:nvSpPr>
-          <p:cNvPr id="26" name="Google Shape;26;p5"/>
+          <p:cNvPr id="27" name="Google Shape;27;p5"/>
           <p:cNvSpPr txBox="1"/>
           <p:nvPr>
             <p:ph idx="2" type="body"/>
@@ -3817,7 +3845,7 @@
       </p:sp>
       <p:sp>
         <p:nvSpPr>
-          <p:cNvPr id="27" name="Google Shape;27;p5"/>
+          <p:cNvPr id="28" name="Google Shape;28;p5"/>
           <p:cNvSpPr txBox="1"/>
           <p:nvPr>
             <p:ph idx="12" type="sldNum"/>
@@ -3905,7 +3933,7 @@
   <p:cSld name="TITLE_ONLY">
     <p:spTree>
       <p:nvGrpSpPr>
-        <p:cNvPr id="28" name="Shape 28"/>
+        <p:cNvPr id="29" name="Shape 29"/>
         <p:cNvGrpSpPr/>
         <p:nvPr/>
       </p:nvGrpSpPr>
@@ -3919,7 +3947,7 @@
       </p:grpSpPr>
       <p:sp>
         <p:nvSpPr>
-          <p:cNvPr id="29" name="Google Shape;29;p6"/>
+          <p:cNvPr id="30" name="Google Shape;30;p6"/>
           <p:cNvSpPr txBox="1"/>
           <p:nvPr>
             <p:ph type="title"/>
@@ -4044,7 +4072,7 @@
       </p:sp>
       <p:sp>
         <p:nvSpPr>
-          <p:cNvPr id="30" name="Google Shape;30;p6"/>
+          <p:cNvPr id="31" name="Google Shape;31;p6"/>
           <p:cNvSpPr txBox="1"/>
           <p:nvPr>
             <p:ph idx="12" type="sldNum"/>
@@ -4132,7 +4160,7 @@
   <p:cSld name="ONE_COLUMN_TEXT">
     <p:spTree>
       <p:nvGrpSpPr>
-        <p:cNvPr id="31" name="Shape 31"/>
+        <p:cNvPr id="32" name="Shape 32"/>
         <p:cNvGrpSpPr/>
         <p:nvPr/>
       </p:nvGrpSpPr>
@@ -4146,7 +4174,7 @@
       </p:grpSpPr>
       <p:sp>
         <p:nvSpPr>
-          <p:cNvPr id="32" name="Google Shape;32;p7"/>
+          <p:cNvPr id="33" name="Google Shape;33;p7"/>
           <p:cNvSpPr txBox="1"/>
           <p:nvPr>
             <p:ph type="title"/>
@@ -4271,7 +4299,7 @@
       </p:sp>
       <p:sp>
         <p:nvSpPr>
-          <p:cNvPr id="33" name="Google Shape;33;p7"/>
+          <p:cNvPr id="34" name="Google Shape;34;p7"/>
           <p:cNvSpPr txBox="1"/>
           <p:nvPr>
             <p:ph idx="1" type="body"/>
@@ -4396,7 +4424,7 @@
       </p:sp>
       <p:sp>
         <p:nvSpPr>
-          <p:cNvPr id="34" name="Google Shape;34;p7"/>
+          <p:cNvPr id="35" name="Google Shape;35;p7"/>
           <p:cNvSpPr txBox="1"/>
           <p:nvPr>
             <p:ph idx="12" type="sldNum"/>
@@ -4491,7 +4519,7 @@
     </p:bg>
     <p:spTree>
       <p:nvGrpSpPr>
-        <p:cNvPr id="35" name="Shape 35"/>
+        <p:cNvPr id="36" name="Shape 36"/>
         <p:cNvGrpSpPr/>
         <p:nvPr/>
       </p:nvGrpSpPr>
@@ -4505,7 +4533,7 @@
       </p:grpSpPr>
       <p:sp>
         <p:nvSpPr>
-          <p:cNvPr id="36" name="Google Shape;36;p8"/>
+          <p:cNvPr id="37" name="Google Shape;37;p8"/>
           <p:cNvSpPr txBox="1"/>
           <p:nvPr>
             <p:ph type="title"/>
@@ -4630,7 +4658,7 @@
       </p:sp>
       <p:sp>
         <p:nvSpPr>
-          <p:cNvPr id="37" name="Google Shape;37;p8"/>
+          <p:cNvPr id="38" name="Google Shape;38;p8"/>
           <p:cNvSpPr txBox="1"/>
           <p:nvPr>
             <p:ph idx="12" type="sldNum"/>
@@ -4718,7 +4746,7 @@
   <p:cSld name="SECTION_TITLE_AND_DESCRIPTION">
     <p:spTree>
       <p:nvGrpSpPr>
-        <p:cNvPr id="38" name="Shape 38"/>
+        <p:cNvPr id="39" name="Shape 39"/>
         <p:cNvGrpSpPr/>
         <p:nvPr/>
       </p:nvGrpSpPr>
@@ -4732,7 +4760,7 @@
       </p:grpSpPr>
       <p:sp>
         <p:nvSpPr>
-          <p:cNvPr id="39" name="Google Shape;39;p9"/>
+          <p:cNvPr id="40" name="Google Shape;40;p9"/>
           <p:cNvSpPr/>
           <p:nvPr/>
         </p:nvSpPr>
@@ -4775,7 +4803,7 @@
       </p:sp>
       <p:cxnSp>
         <p:nvCxnSpPr>
-          <p:cNvPr id="40" name="Google Shape;40;p9"/>
+          <p:cNvPr id="41" name="Google Shape;41;p9"/>
           <p:cNvCxnSpPr/>
           <p:nvPr/>
         </p:nvCxnSpPr>
@@ -4801,7 +4829,7 @@
       </p:cxnSp>
       <p:sp>
         <p:nvSpPr>
-          <p:cNvPr id="41" name="Google Shape;41;p9"/>
+          <p:cNvPr id="42" name="Google Shape;42;p9"/>
           <p:cNvSpPr txBox="1"/>
           <p:nvPr>
             <p:ph type="title"/>
@@ -4926,7 +4954,7 @@
       </p:sp>
       <p:sp>
         <p:nvSpPr>
-          <p:cNvPr id="42" name="Google Shape;42;p9"/>
+          <p:cNvPr id="43" name="Google Shape;43;p9"/>
           <p:cNvSpPr txBox="1"/>
           <p:nvPr>
             <p:ph idx="1" type="subTitle"/>
@@ -5078,7 +5106,7 @@
       </p:sp>
       <p:sp>
         <p:nvSpPr>
-          <p:cNvPr id="43" name="Google Shape;43;p9"/>
+          <p:cNvPr id="44" name="Google Shape;44;p9"/>
           <p:cNvSpPr txBox="1"/>
           <p:nvPr>
             <p:ph idx="2" type="body"/>
@@ -5266,7 +5294,7 @@
       </p:sp>
       <p:sp>
         <p:nvSpPr>
-          <p:cNvPr id="44" name="Google Shape;44;p9"/>
+          <p:cNvPr id="45" name="Google Shape;45;p9"/>
           <p:cNvSpPr txBox="1"/>
           <p:nvPr>
             <p:ph idx="12" type="sldNum"/>
@@ -5390,7 +5418,7 @@
   <p:cSld name="CAPTION_ONLY">
     <p:spTree>
       <p:nvGrpSpPr>
-        <p:cNvPr id="45" name="Shape 45"/>
+        <p:cNvPr id="46" name="Shape 46"/>
         <p:cNvGrpSpPr/>
         <p:nvPr/>
       </p:nvGrpSpPr>
@@ -5404,7 +5432,7 @@
       </p:grpSpPr>
       <p:sp>
         <p:nvSpPr>
-          <p:cNvPr id="46" name="Google Shape;46;p10"/>
+          <p:cNvPr id="47" name="Google Shape;47;p10"/>
           <p:cNvSpPr txBox="1"/>
           <p:nvPr>
             <p:ph idx="1" type="body"/>
@@ -5444,7 +5472,7 @@
       </p:sp>
       <p:sp>
         <p:nvSpPr>
-          <p:cNvPr id="47" name="Google Shape;47;p10"/>
+          <p:cNvPr id="48" name="Google Shape;48;p10"/>
           <p:cNvSpPr txBox="1"/>
           <p:nvPr>
             <p:ph idx="12" type="sldNum"/>
@@ -6919,7 +6947,7 @@
   <p:cSld>
     <p:spTree>
       <p:nvGrpSpPr>
-        <p:cNvPr id="58" name="Shape 58"/>
+        <p:cNvPr id="59" name="Shape 59"/>
         <p:cNvGrpSpPr/>
         <p:nvPr/>
       </p:nvGrpSpPr>
@@ -6933,7 +6961,7 @@
       </p:grpSpPr>
       <p:sp>
         <p:nvSpPr>
-          <p:cNvPr id="59" name="Google Shape;59;p13"/>
+          <p:cNvPr id="60" name="Google Shape;60;p13"/>
           <p:cNvSpPr txBox="1"/>
           <p:nvPr>
             <p:ph type="ctrTitle"/>
@@ -6973,7 +7001,7 @@
       </p:sp>
       <p:sp>
         <p:nvSpPr>
-          <p:cNvPr id="60" name="Google Shape;60;p13"/>
+          <p:cNvPr id="61" name="Google Shape;61;p13"/>
           <p:cNvSpPr txBox="1"/>
           <p:nvPr>
             <p:ph idx="1" type="subTitle"/>
@@ -7024,7 +7052,7 @@
   <p:cSld>
     <p:spTree>
       <p:nvGrpSpPr>
-        <p:cNvPr id="64" name="Shape 64"/>
+        <p:cNvPr id="65" name="Shape 65"/>
         <p:cNvGrpSpPr/>
         <p:nvPr/>
       </p:nvGrpSpPr>
@@ -7036,9 +7064,36 @@
           <a:chExt cx="0" cy="0"/>
         </a:xfrm>
       </p:grpSpPr>
+      <p:pic>
+        <p:nvPicPr>
+          <p:cNvPr id="66" name="Google Shape;66;p14"/>
+          <p:cNvPicPr preferRelativeResize="0"/>
+          <p:nvPr/>
+        </p:nvPicPr>
+        <p:blipFill rotWithShape="1">
+          <a:blip r:embed="rId3">
+            <a:alphaModFix/>
+          </a:blip>
+          <a:srcRect b="0" l="0" r="0" t="13711"/>
+          <a:stretch/>
+        </p:blipFill>
+        <p:spPr>
+          <a:xfrm>
+            <a:off x="5384900" y="3113638"/>
+            <a:ext cx="2585875" cy="1226725"/>
+          </a:xfrm>
+          <a:prstGeom prst="rect">
+            <a:avLst/>
+          </a:prstGeom>
+          <a:noFill/>
+          <a:ln>
+            <a:noFill/>
+          </a:ln>
+        </p:spPr>
+      </p:pic>
       <p:sp>
         <p:nvSpPr>
-          <p:cNvPr id="65" name="Google Shape;65;p14"/>
+          <p:cNvPr id="67" name="Google Shape;67;p14"/>
           <p:cNvSpPr txBox="1"/>
           <p:nvPr>
             <p:ph type="title"/>
@@ -7047,11 +7102,12 @@
         <p:spPr>
           <a:xfrm>
             <a:off x="311700" y="445025"/>
-            <a:ext cx="8520600" cy="572700"/>
+            <a:ext cx="8832300" cy="572700"/>
           </a:xfrm>
           <a:prstGeom prst="rect">
             <a:avLst/>
           </a:prstGeom>
+          <a:noFill/>
         </p:spPr>
         <p:txBody>
           <a:bodyPr anchorCtr="0" anchor="t" bIns="91425" lIns="91425" spcFirstLastPara="1" rIns="91425" wrap="square" tIns="91425">
@@ -7078,7 +7134,7 @@
       </p:sp>
       <p:sp>
         <p:nvSpPr>
-          <p:cNvPr id="66" name="Google Shape;66;p14"/>
+          <p:cNvPr id="68" name="Google Shape;68;p14"/>
           <p:cNvSpPr txBox="1"/>
           <p:nvPr>
             <p:ph idx="1" type="body"/>
@@ -7087,7 +7143,7 @@
         <p:spPr>
           <a:xfrm>
             <a:off x="311700" y="1152475"/>
-            <a:ext cx="4722600" cy="3461400"/>
+            <a:ext cx="4549500" cy="3461400"/>
           </a:xfrm>
           <a:prstGeom prst="rect">
             <a:avLst/>
@@ -7111,7 +7167,7 @@
             </a:pPr>
             <a:r>
               <a:rPr lang="en-GB"/>
-              <a:t>Building an NLP model using deep learning to identify if text content is sensitive </a:t>
+              <a:t>Build an NLP model using deep learning to identify if text content is sensitive </a:t>
             </a:r>
             <a:endParaRPr/>
           </a:p>
@@ -7128,7 +7184,7 @@
             </a:pPr>
             <a:r>
               <a:rPr lang="en-GB"/>
-              <a:t>Provide explanations for why the text content is sensitive</a:t>
+              <a:t>Explain why the text content is sensitive</a:t>
             </a:r>
             <a:endParaRPr/>
           </a:p>
@@ -7145,7 +7201,11 @@
             </a:pPr>
             <a:r>
               <a:rPr lang="en-GB"/>
-              <a:t>Does it contain profanity?</a:t>
+              <a:t>Does it contain profanity</a:t>
+            </a:r>
+            <a:r>
+              <a:rPr lang="en-GB"/>
+              <a:t>?</a:t>
             </a:r>
             <a:endParaRPr/>
           </a:p>
@@ -7204,12 +7264,12 @@
       </p:sp>
       <p:pic>
         <p:nvPicPr>
-          <p:cNvPr id="67" name="Google Shape;67;p14"/>
+          <p:cNvPr id="69" name="Google Shape;69;p14"/>
           <p:cNvPicPr preferRelativeResize="0"/>
           <p:nvPr/>
         </p:nvPicPr>
         <p:blipFill>
-          <a:blip r:embed="rId3">
+          <a:blip r:embed="rId4">
             <a:alphaModFix/>
           </a:blip>
           <a:stretch>
@@ -7218,7 +7278,7 @@
         </p:blipFill>
         <p:spPr>
           <a:xfrm>
-            <a:off x="4804625" y="1255725"/>
+            <a:off x="4880825" y="1255725"/>
             <a:ext cx="3882000" cy="510600"/>
           </a:xfrm>
           <a:prstGeom prst="rect">
@@ -7232,34 +7292,7 @@
       </p:pic>
       <p:pic>
         <p:nvPicPr>
-          <p:cNvPr id="68" name="Google Shape;68;p14"/>
-          <p:cNvPicPr preferRelativeResize="0"/>
-          <p:nvPr/>
-        </p:nvPicPr>
-        <p:blipFill rotWithShape="1">
-          <a:blip r:embed="rId4">
-            <a:alphaModFix/>
-          </a:blip>
-          <a:srcRect b="0" l="0" r="0" t="13711"/>
-          <a:stretch/>
-        </p:blipFill>
-        <p:spPr>
-          <a:xfrm>
-            <a:off x="5384900" y="3266038"/>
-            <a:ext cx="2585875" cy="1226725"/>
-          </a:xfrm>
-          <a:prstGeom prst="rect">
-            <a:avLst/>
-          </a:prstGeom>
-          <a:noFill/>
-          <a:ln>
-            <a:noFill/>
-          </a:ln>
-        </p:spPr>
-      </p:pic>
-      <p:pic>
-        <p:nvPicPr>
-          <p:cNvPr id="69" name="Google Shape;69;p14"/>
+          <p:cNvPr id="70" name="Google Shape;70;p14"/>
           <p:cNvPicPr preferRelativeResize="0"/>
           <p:nvPr/>
         </p:nvPicPr>
@@ -7287,7 +7320,7 @@
       </p:pic>
       <p:pic>
         <p:nvPicPr>
-          <p:cNvPr id="70" name="Google Shape;70;p14"/>
+          <p:cNvPr id="71" name="Google Shape;71;p14"/>
           <p:cNvPicPr preferRelativeResize="0"/>
           <p:nvPr/>
         </p:nvPicPr>
@@ -7326,7 +7359,7 @@
   <p:cSld>
     <p:spTree>
       <p:nvGrpSpPr>
-        <p:cNvPr id="74" name="Shape 74"/>
+        <p:cNvPr id="75" name="Shape 75"/>
         <p:cNvGrpSpPr/>
         <p:nvPr/>
       </p:nvGrpSpPr>
@@ -7340,7 +7373,7 @@
       </p:grpSpPr>
       <p:pic>
         <p:nvPicPr>
-          <p:cNvPr id="75" name="Google Shape;75;p15"/>
+          <p:cNvPr id="76" name="Google Shape;76;p15"/>
           <p:cNvPicPr preferRelativeResize="0"/>
           <p:nvPr/>
         </p:nvPicPr>
@@ -7368,7 +7401,7 @@
       </p:pic>
       <p:sp>
         <p:nvSpPr>
-          <p:cNvPr id="76" name="Google Shape;76;p15"/>
+          <p:cNvPr id="77" name="Google Shape;77;p15"/>
           <p:cNvSpPr txBox="1"/>
           <p:nvPr>
             <p:ph type="title"/>
@@ -7400,7 +7433,11 @@
             </a:pPr>
             <a:r>
               <a:rPr lang="en-GB"/>
-              <a:t>Data Exploration</a:t>
+              <a:t>Data</a:t>
+            </a:r>
+            <a:r>
+              <a:rPr lang="en-GB"/>
+              <a:t> Exploration</a:t>
             </a:r>
             <a:endParaRPr/>
           </a:p>
@@ -7408,7 +7445,7 @@
       </p:sp>
       <p:sp>
         <p:nvSpPr>
-          <p:cNvPr id="77" name="Google Shape;77;p15"/>
+          <p:cNvPr id="78" name="Google Shape;78;p15"/>
           <p:cNvSpPr txBox="1"/>
           <p:nvPr>
             <p:ph idx="1" type="body"/>
@@ -7416,7 +7453,7 @@
         </p:nvSpPr>
         <p:spPr>
           <a:xfrm>
-            <a:off x="386075" y="1017725"/>
+            <a:off x="309875" y="1170125"/>
             <a:ext cx="5625000" cy="3416400"/>
           </a:xfrm>
           <a:prstGeom prst="rect">
@@ -7481,7 +7518,7 @@
       </p:sp>
       <p:pic>
         <p:nvPicPr>
-          <p:cNvPr id="78" name="Google Shape;78;p15"/>
+          <p:cNvPr id="79" name="Google Shape;79;p15"/>
           <p:cNvPicPr preferRelativeResize="0"/>
           <p:nvPr/>
         </p:nvPicPr>
@@ -7520,7 +7557,7 @@
   <p:cSld>
     <p:spTree>
       <p:nvGrpSpPr>
-        <p:cNvPr id="82" name="Shape 82"/>
+        <p:cNvPr id="83" name="Shape 83"/>
         <p:cNvGrpSpPr/>
         <p:nvPr/>
       </p:nvGrpSpPr>
@@ -7534,7 +7571,7 @@
       </p:grpSpPr>
       <p:sp>
         <p:nvSpPr>
-          <p:cNvPr id="83" name="Google Shape;83;p16"/>
+          <p:cNvPr id="84" name="Google Shape;84;p16"/>
           <p:cNvSpPr txBox="1"/>
           <p:nvPr>
             <p:ph idx="1" type="body"/>
@@ -7803,7 +7840,7 @@
       </p:sp>
       <p:sp>
         <p:nvSpPr>
-          <p:cNvPr id="84" name="Google Shape;84;p16"/>
+          <p:cNvPr id="85" name="Google Shape;85;p16"/>
           <p:cNvSpPr txBox="1"/>
           <p:nvPr>
             <p:ph type="title"/>
@@ -7854,7 +7891,7 @@
   <p:cSld>
     <p:spTree>
       <p:nvGrpSpPr>
-        <p:cNvPr id="88" name="Shape 88"/>
+        <p:cNvPr id="89" name="Shape 89"/>
         <p:cNvGrpSpPr/>
         <p:nvPr/>
       </p:nvGrpSpPr>
@@ -7868,7 +7905,7 @@
       </p:grpSpPr>
       <p:sp>
         <p:nvSpPr>
-          <p:cNvPr id="89" name="Google Shape;89;p17"/>
+          <p:cNvPr id="90" name="Google Shape;90;p17"/>
           <p:cNvSpPr txBox="1"/>
           <p:nvPr>
             <p:ph type="title"/>
@@ -7908,7 +7945,7 @@
       </p:sp>
       <p:sp>
         <p:nvSpPr>
-          <p:cNvPr id="90" name="Google Shape;90;p17"/>
+          <p:cNvPr id="91" name="Google Shape;91;p17"/>
           <p:cNvSpPr txBox="1"/>
           <p:nvPr>
             <p:ph idx="1" type="body"/>
@@ -7941,24 +7978,7 @@
             </a:pPr>
             <a:r>
               <a:rPr lang="en-GB"/>
-              <a:t>Final model had good accuracy and recall</a:t>
-            </a:r>
-            <a:endParaRPr/>
-          </a:p>
-          <a:p>
-            <a:pPr indent="-342900" lvl="0" marL="457200" rtl="0" algn="l">
-              <a:spcBef>
-                <a:spcPts val="0"/>
-              </a:spcBef>
-              <a:spcAft>
-                <a:spcPts val="0"/>
-              </a:spcAft>
-              <a:buSzPts val="1800"/>
-              <a:buChar char="-"/>
-            </a:pPr>
-            <a:r>
-              <a:rPr lang="en-GB"/>
-              <a:t>The model was able to identify sensitive content along with the reasons why it was classified as sensitive: threat, insult, obscene etc</a:t>
+              <a:t>Final model had good accuracy, AUC and recall</a:t>
             </a:r>
             <a:endParaRPr/>
           </a:p>
@@ -8102,7 +8122,7 @@
   <p:cSld>
     <p:spTree>
       <p:nvGrpSpPr>
-        <p:cNvPr id="94" name="Shape 94"/>
+        <p:cNvPr id="95" name="Shape 95"/>
         <p:cNvGrpSpPr/>
         <p:nvPr/>
       </p:nvGrpSpPr>
@@ -8116,7 +8136,7 @@
       </p:grpSpPr>
       <p:sp>
         <p:nvSpPr>
-          <p:cNvPr id="95" name="Google Shape;95;p18"/>
+          <p:cNvPr id="96" name="Google Shape;96;p18"/>
           <p:cNvSpPr txBox="1"/>
           <p:nvPr>
             <p:ph idx="1" type="body"/>
@@ -8303,7 +8323,7 @@
       </p:sp>
       <p:sp>
         <p:nvSpPr>
-          <p:cNvPr id="96" name="Google Shape;96;p18"/>
+          <p:cNvPr id="97" name="Google Shape;97;p18"/>
           <p:cNvSpPr txBox="1"/>
           <p:nvPr>
             <p:ph type="title"/>
@@ -8354,7 +8374,7 @@
   <p:cSld>
     <p:spTree>
       <p:nvGrpSpPr>
-        <p:cNvPr id="100" name="Shape 100"/>
+        <p:cNvPr id="101" name="Shape 101"/>
         <p:cNvGrpSpPr/>
         <p:nvPr/>
       </p:nvGrpSpPr>
@@ -8368,7 +8388,7 @@
       </p:grpSpPr>
       <p:sp>
         <p:nvSpPr>
-          <p:cNvPr id="101" name="Google Shape;101;p19"/>
+          <p:cNvPr id="102" name="Google Shape;102;p19"/>
           <p:cNvSpPr txBox="1"/>
           <p:nvPr>
             <p:ph type="title"/>
@@ -8408,7 +8428,7 @@
       </p:sp>
       <p:graphicFrame>
         <p:nvGraphicFramePr>
-          <p:cNvPr id="102" name="Google Shape;102;p19"/>
+          <p:cNvPr id="103" name="Google Shape;103;p19"/>
           <p:cNvGraphicFramePr/>
           <p:nvPr/>
         </p:nvGraphicFramePr>
@@ -8421,16 +8441,16 @@
             <a:tbl>
               <a:tblPr>
                 <a:noFill/>
-                <a:tableStyleId>{78CAC0E2-35CB-44A0-879C-FBC3ACC6E584}</a:tableStyleId>
+                <a:tableStyleId>{4A715226-932A-4B2E-8F3D-F27B078A5E25}</a:tableStyleId>
               </a:tblPr>
               <a:tblGrid>
                 <a:gridCol w="1221400"/>
                 <a:gridCol w="602125"/>
                 <a:gridCol w="963400"/>
                 <a:gridCol w="725975"/>
-                <a:gridCol w="1303975"/>
-                <a:gridCol w="1211075"/>
-                <a:gridCol w="1211075"/>
+                <a:gridCol w="940300"/>
+                <a:gridCol w="933975"/>
+                <a:gridCol w="1055200"/>
               </a:tblGrid>
               <a:tr h="381000">
                 <a:tc>
@@ -8448,10 +8468,18 @@
                         <a:buNone/>
                       </a:pPr>
                       <a:r>
-                        <a:rPr b="1" lang="en-GB" sz="1100"/>
+                        <a:rPr b="1" lang="en-GB" sz="1100">
+                          <a:solidFill>
+                            <a:schemeClr val="lt1"/>
+                          </a:solidFill>
+                        </a:rPr>
                         <a:t>Metric</a:t>
                       </a:r>
-                      <a:endParaRPr b="1" sz="1100"/>
+                      <a:endParaRPr b="1" sz="1100">
+                        <a:solidFill>
+                          <a:schemeClr val="lt1"/>
+                        </a:solidFill>
+                      </a:endParaRPr>
                     </a:p>
                     <a:p>
                       <a:pPr indent="0" lvl="0" marL="0" rtl="0" algn="l">
@@ -8464,20 +8492,32 @@
                         <a:buNone/>
                       </a:pPr>
                       <a:r>
-                        <a:rPr b="1" lang="en-GB" sz="1100"/>
+                        <a:rPr b="1" lang="en-GB" sz="1100">
+                          <a:solidFill>
+                            <a:schemeClr val="lt1"/>
+                          </a:solidFill>
+                        </a:rPr>
                         <a:t>(Validation)</a:t>
                       </a:r>
-                      <a:endParaRPr b="1" sz="1100"/>
+                      <a:endParaRPr b="1" sz="1100">
+                        <a:solidFill>
+                          <a:schemeClr val="lt1"/>
+                        </a:solidFill>
+                      </a:endParaRPr>
                     </a:p>
                   </a:txBody>
-                  <a:tcPr marT="91425" marB="91425" marR="91425" marL="91425"/>
+                  <a:tcPr marT="91425" marB="91425" marR="91425" marL="91425">
+                    <a:solidFill>
+                      <a:schemeClr val="lt2"/>
+                    </a:solidFill>
+                  </a:tcPr>
                 </a:tc>
                 <a:tc>
                   <a:txBody>
                     <a:bodyPr/>
                     <a:lstStyle/>
                     <a:p>
-                      <a:pPr indent="0" lvl="0" marL="0" rtl="0" algn="l">
+                      <a:pPr indent="0" lvl="0" marL="0" rtl="0" algn="r">
                         <a:spcBef>
                           <a:spcPts val="0"/>
                         </a:spcBef>
@@ -8487,20 +8527,32 @@
                         <a:buNone/>
                       </a:pPr>
                       <a:r>
-                        <a:rPr b="1" lang="en-GB" sz="1100"/>
+                        <a:rPr b="1" lang="en-GB" sz="1100">
+                          <a:solidFill>
+                            <a:schemeClr val="lt1"/>
+                          </a:solidFill>
+                        </a:rPr>
                         <a:t>LSTM</a:t>
                       </a:r>
-                      <a:endParaRPr b="1" sz="1100"/>
+                      <a:endParaRPr b="1" sz="1100">
+                        <a:solidFill>
+                          <a:schemeClr val="lt1"/>
+                        </a:solidFill>
+                      </a:endParaRPr>
                     </a:p>
                   </a:txBody>
-                  <a:tcPr marT="91425" marB="91425" marR="91425" marL="91425"/>
+                  <a:tcPr marT="91425" marB="91425" marR="91425" marL="91425">
+                    <a:solidFill>
+                      <a:schemeClr val="lt2"/>
+                    </a:solidFill>
+                  </a:tcPr>
                 </a:tc>
                 <a:tc>
                   <a:txBody>
                     <a:bodyPr/>
                     <a:lstStyle/>
                     <a:p>
-                      <a:pPr indent="0" lvl="0" marL="0" rtl="0" algn="l">
+                      <a:pPr indent="0" lvl="0" marL="0" rtl="0" algn="r">
                         <a:spcBef>
                           <a:spcPts val="0"/>
                         </a:spcBef>
@@ -8510,20 +8562,32 @@
                         <a:buNone/>
                       </a:pPr>
                       <a:r>
-                        <a:rPr b="1" lang="en-GB" sz="1100"/>
+                        <a:rPr b="1" lang="en-GB" sz="1100">
+                          <a:solidFill>
+                            <a:schemeClr val="lt1"/>
+                          </a:solidFill>
+                        </a:rPr>
                         <a:t>LSTM with Weights</a:t>
                       </a:r>
-                      <a:endParaRPr b="1" sz="1100"/>
+                      <a:endParaRPr b="1" sz="1100">
+                        <a:solidFill>
+                          <a:schemeClr val="lt1"/>
+                        </a:solidFill>
+                      </a:endParaRPr>
                     </a:p>
                   </a:txBody>
-                  <a:tcPr marT="91425" marB="91425" marR="91425" marL="91425"/>
+                  <a:tcPr marT="91425" marB="91425" marR="91425" marL="91425">
+                    <a:solidFill>
+                      <a:schemeClr val="lt2"/>
+                    </a:solidFill>
+                  </a:tcPr>
                 </a:tc>
                 <a:tc>
                   <a:txBody>
                     <a:bodyPr/>
                     <a:lstStyle/>
                     <a:p>
-                      <a:pPr indent="0" lvl="0" marL="0" rtl="0" algn="l">
+                      <a:pPr indent="0" lvl="0" marL="0" rtl="0" algn="r">
                         <a:spcBef>
                           <a:spcPts val="0"/>
                         </a:spcBef>
@@ -8533,20 +8597,32 @@
                         <a:buNone/>
                       </a:pPr>
                       <a:r>
-                        <a:rPr b="1" lang="en-GB" sz="1100"/>
+                        <a:rPr b="1" lang="en-GB" sz="1100">
+                          <a:solidFill>
+                            <a:schemeClr val="lt1"/>
+                          </a:solidFill>
+                        </a:rPr>
                         <a:t>BERT </a:t>
                       </a:r>
-                      <a:endParaRPr b="1" sz="1100"/>
+                      <a:endParaRPr b="1" sz="1100">
+                        <a:solidFill>
+                          <a:schemeClr val="lt1"/>
+                        </a:solidFill>
+                      </a:endParaRPr>
                     </a:p>
                   </a:txBody>
-                  <a:tcPr marT="91425" marB="91425" marR="91425" marL="91425"/>
+                  <a:tcPr marT="91425" marB="91425" marR="91425" marL="91425">
+                    <a:solidFill>
+                      <a:schemeClr val="lt2"/>
+                    </a:solidFill>
+                  </a:tcPr>
                 </a:tc>
                 <a:tc>
                   <a:txBody>
                     <a:bodyPr/>
                     <a:lstStyle/>
                     <a:p>
-                      <a:pPr indent="0" lvl="0" marL="0" rtl="0" algn="l">
+                      <a:pPr indent="0" lvl="0" marL="0" rtl="0" algn="r">
                         <a:spcBef>
                           <a:spcPts val="0"/>
                         </a:spcBef>
@@ -8556,28 +8632,48 @@
                         <a:buNone/>
                       </a:pPr>
                       <a:r>
-                        <a:rPr b="1" lang="en-GB" sz="1100"/>
+                        <a:rPr b="1" lang="en-GB" sz="1100">
+                          <a:solidFill>
+                            <a:schemeClr val="lt1"/>
+                          </a:solidFill>
+                        </a:rPr>
                         <a:t>BERT </a:t>
                       </a:r>
                       <a:r>
-                        <a:rPr b="1" lang="en-GB" sz="1100"/>
+                        <a:rPr b="1" lang="en-GB" sz="1100">
+                          <a:solidFill>
+                            <a:schemeClr val="lt1"/>
+                          </a:solidFill>
+                        </a:rPr>
                         <a:t>with</a:t>
                       </a:r>
                       <a:r>
-                        <a:rPr b="1" lang="en-GB" sz="1100"/>
+                        <a:rPr b="1" lang="en-GB" sz="1100">
+                          <a:solidFill>
+                            <a:schemeClr val="lt1"/>
+                          </a:solidFill>
+                        </a:rPr>
                         <a:t> Weights</a:t>
                       </a:r>
-                      <a:endParaRPr b="1" sz="1100"/>
+                      <a:endParaRPr b="1" sz="1100">
+                        <a:solidFill>
+                          <a:schemeClr val="lt1"/>
+                        </a:solidFill>
+                      </a:endParaRPr>
                     </a:p>
                   </a:txBody>
-                  <a:tcPr marT="91425" marB="91425" marR="91425" marL="91425"/>
+                  <a:tcPr marT="91425" marB="91425" marR="91425" marL="91425">
+                    <a:solidFill>
+                      <a:schemeClr val="lt2"/>
+                    </a:solidFill>
+                  </a:tcPr>
                 </a:tc>
                 <a:tc>
                   <a:txBody>
                     <a:bodyPr/>
                     <a:lstStyle/>
                     <a:p>
-                      <a:pPr indent="0" lvl="0" marL="0" rtl="0" algn="l">
+                      <a:pPr indent="0" lvl="0" marL="0" rtl="0" algn="r">
                         <a:spcBef>
                           <a:spcPts val="0"/>
                         </a:spcBef>
@@ -8587,20 +8683,32 @@
                         <a:buNone/>
                       </a:pPr>
                       <a:r>
-                        <a:rPr b="1" lang="en-GB" sz="1100"/>
+                        <a:rPr b="1" lang="en-GB" sz="1100">
+                          <a:solidFill>
+                            <a:schemeClr val="lt1"/>
+                          </a:solidFill>
+                        </a:rPr>
                         <a:t>RoBERTa</a:t>
                       </a:r>
-                      <a:endParaRPr b="1" sz="1100"/>
+                      <a:endParaRPr b="1" sz="1100">
+                        <a:solidFill>
+                          <a:schemeClr val="lt1"/>
+                        </a:solidFill>
+                      </a:endParaRPr>
                     </a:p>
                   </a:txBody>
-                  <a:tcPr marT="91425" marB="91425" marR="91425" marL="91425"/>
+                  <a:tcPr marT="91425" marB="91425" marR="91425" marL="91425">
+                    <a:solidFill>
+                      <a:schemeClr val="lt2"/>
+                    </a:solidFill>
+                  </a:tcPr>
                 </a:tc>
                 <a:tc>
                   <a:txBody>
                     <a:bodyPr/>
                     <a:lstStyle/>
                     <a:p>
-                      <a:pPr indent="0" lvl="0" marL="0" rtl="0" algn="l">
+                      <a:pPr indent="0" lvl="0" marL="0" rtl="0" algn="r">
                         <a:spcBef>
                           <a:spcPts val="0"/>
                         </a:spcBef>
@@ -8610,13 +8718,25 @@
                         <a:buNone/>
                       </a:pPr>
                       <a:r>
-                        <a:rPr b="1" lang="en-GB" sz="1100"/>
+                        <a:rPr b="1" lang="en-GB" sz="1100">
+                          <a:solidFill>
+                            <a:schemeClr val="lt1"/>
+                          </a:solidFill>
+                        </a:rPr>
                         <a:t>RoBERTa with Weights</a:t>
                       </a:r>
-                      <a:endParaRPr b="1" sz="1100"/>
+                      <a:endParaRPr b="1" sz="1100">
+                        <a:solidFill>
+                          <a:schemeClr val="lt1"/>
+                        </a:solidFill>
+                      </a:endParaRPr>
                     </a:p>
                   </a:txBody>
-                  <a:tcPr marT="91425" marB="91425" marR="91425" marL="91425"/>
+                  <a:tcPr marT="91425" marB="91425" marR="91425" marL="91425">
+                    <a:solidFill>
+                      <a:schemeClr val="lt2"/>
+                    </a:solidFill>
+                  </a:tcPr>
                 </a:tc>
               </a:tr>
               <a:tr h="381000">
@@ -8648,7 +8768,7 @@
                     <a:bodyPr/>
                     <a:lstStyle/>
                     <a:p>
-                      <a:pPr indent="0" lvl="0" marL="0" rtl="0" algn="l">
+                      <a:pPr indent="0" lvl="0" marL="0" rtl="0" algn="r">
                         <a:spcBef>
                           <a:spcPts val="0"/>
                         </a:spcBef>
@@ -8671,7 +8791,7 @@
                     <a:bodyPr/>
                     <a:lstStyle/>
                     <a:p>
-                      <a:pPr indent="0" lvl="0" marL="0" rtl="0" algn="l">
+                      <a:pPr indent="0" lvl="0" marL="0" rtl="0" algn="r">
                         <a:spcBef>
                           <a:spcPts val="0"/>
                         </a:spcBef>
@@ -8694,7 +8814,7 @@
                     <a:bodyPr/>
                     <a:lstStyle/>
                     <a:p>
-                      <a:pPr indent="0" lvl="0" marL="0" rtl="0" algn="l">
+                      <a:pPr indent="0" lvl="0" marL="0" rtl="0" algn="r">
                         <a:spcBef>
                           <a:spcPts val="0"/>
                         </a:spcBef>
@@ -8705,7 +8825,7 @@
                       </a:pPr>
                       <a:r>
                         <a:rPr b="1" lang="en-GB" sz="1100"/>
-                        <a:t>0.927</a:t>
+                        <a:t>0.93</a:t>
                       </a:r>
                       <a:endParaRPr b="1" sz="1100"/>
                     </a:p>
@@ -8717,7 +8837,7 @@
                     <a:bodyPr/>
                     <a:lstStyle/>
                     <a:p>
-                      <a:pPr indent="0" lvl="0" marL="0" rtl="0" algn="l">
+                      <a:pPr indent="0" lvl="0" marL="0" rtl="0" algn="r">
                         <a:spcBef>
                           <a:spcPts val="0"/>
                         </a:spcBef>
@@ -8728,7 +8848,7 @@
                       </a:pPr>
                       <a:r>
                         <a:rPr lang="en-GB" sz="1100"/>
-                        <a:t>0.925</a:t>
+                        <a:t>0.93</a:t>
                       </a:r>
                       <a:endParaRPr sz="1100"/>
                     </a:p>
@@ -8740,7 +8860,7 @@
                     <a:bodyPr/>
                     <a:lstStyle/>
                     <a:p>
-                      <a:pPr indent="0" lvl="0" marL="0" rtl="0" algn="l">
+                      <a:pPr indent="0" lvl="0" marL="0" rtl="0" algn="r">
                         <a:spcBef>
                           <a:spcPts val="0"/>
                         </a:spcBef>
@@ -8751,7 +8871,7 @@
                       </a:pPr>
                       <a:r>
                         <a:rPr lang="en-GB" sz="1100"/>
-                        <a:t>0.926</a:t>
+                        <a:t>0.93</a:t>
                       </a:r>
                       <a:endParaRPr sz="1100"/>
                     </a:p>
@@ -8763,7 +8883,7 @@
                     <a:bodyPr/>
                     <a:lstStyle/>
                     <a:p>
-                      <a:pPr indent="0" lvl="0" marL="0" rtl="0" algn="l">
+                      <a:pPr indent="0" lvl="0" marL="0" rtl="0" algn="r">
                         <a:spcBef>
                           <a:spcPts val="0"/>
                         </a:spcBef>
@@ -8774,7 +8894,7 @@
                       </a:pPr>
                       <a:r>
                         <a:rPr lang="en-GB" sz="1100"/>
-                        <a:t>0.925</a:t>
+                        <a:t>0.93</a:t>
                       </a:r>
                       <a:endParaRPr sz="1100"/>
                     </a:p>
@@ -8811,7 +8931,7 @@
                     <a:bodyPr/>
                     <a:lstStyle/>
                     <a:p>
-                      <a:pPr indent="0" lvl="0" marL="0" rtl="0" algn="l">
+                      <a:pPr indent="0" lvl="0" marL="0" rtl="0" algn="r">
                         <a:spcBef>
                           <a:spcPts val="0"/>
                         </a:spcBef>
@@ -8834,7 +8954,7 @@
                     <a:bodyPr/>
                     <a:lstStyle/>
                     <a:p>
-                      <a:pPr indent="0" lvl="0" marL="0" rtl="0" algn="l">
+                      <a:pPr indent="0" lvl="0" marL="0" rtl="0" algn="r">
                         <a:spcBef>
                           <a:spcPts val="0"/>
                         </a:spcBef>
@@ -8857,7 +8977,7 @@
                     <a:bodyPr/>
                     <a:lstStyle/>
                     <a:p>
-                      <a:pPr indent="0" lvl="0" marL="0" rtl="0" algn="l">
+                      <a:pPr indent="0" lvl="0" marL="0" rtl="0" algn="r">
                         <a:spcBef>
                           <a:spcPts val="0"/>
                         </a:spcBef>
@@ -8880,7 +9000,7 @@
                     <a:bodyPr/>
                     <a:lstStyle/>
                     <a:p>
-                      <a:pPr indent="0" lvl="0" marL="0" rtl="0" algn="l">
+                      <a:pPr indent="0" lvl="0" marL="0" rtl="0" algn="r">
                         <a:spcBef>
                           <a:spcPts val="0"/>
                         </a:spcBef>
@@ -8903,7 +9023,7 @@
                     <a:bodyPr/>
                     <a:lstStyle/>
                     <a:p>
-                      <a:pPr indent="0" lvl="0" marL="0" rtl="0" algn="l">
+                      <a:pPr indent="0" lvl="0" marL="0" rtl="0" algn="r">
                         <a:spcBef>
                           <a:spcPts val="0"/>
                         </a:spcBef>
@@ -8926,7 +9046,7 @@
                     <a:bodyPr/>
                     <a:lstStyle/>
                     <a:p>
-                      <a:pPr indent="0" lvl="0" marL="0" rtl="0" algn="l">
+                      <a:pPr indent="0" lvl="0" marL="0" rtl="0" algn="r">
                         <a:spcBef>
                           <a:spcPts val="0"/>
                         </a:spcBef>
@@ -8974,7 +9094,7 @@
                     <a:bodyPr/>
                     <a:lstStyle/>
                     <a:p>
-                      <a:pPr indent="0" lvl="0" marL="0" rtl="0" algn="l">
+                      <a:pPr indent="0" lvl="0" marL="0" rtl="0" algn="r">
                         <a:spcBef>
                           <a:spcPts val="0"/>
                         </a:spcBef>
@@ -8997,7 +9117,7 @@
                     <a:bodyPr/>
                     <a:lstStyle/>
                     <a:p>
-                      <a:pPr indent="0" lvl="0" marL="0" rtl="0" algn="l">
+                      <a:pPr indent="0" lvl="0" marL="0" rtl="0" algn="r">
                         <a:spcBef>
                           <a:spcPts val="0"/>
                         </a:spcBef>
@@ -9020,7 +9140,7 @@
                     <a:bodyPr/>
                     <a:lstStyle/>
                     <a:p>
-                      <a:pPr indent="0" lvl="0" marL="0" rtl="0" algn="l">
+                      <a:pPr indent="0" lvl="0" marL="0" rtl="0" algn="r">
                         <a:spcBef>
                           <a:spcPts val="0"/>
                         </a:spcBef>
@@ -9043,7 +9163,7 @@
                     <a:bodyPr/>
                     <a:lstStyle/>
                     <a:p>
-                      <a:pPr indent="0" lvl="0" marL="0" rtl="0" algn="l">
+                      <a:pPr indent="0" lvl="0" marL="0" rtl="0" algn="r">
                         <a:spcBef>
                           <a:spcPts val="0"/>
                         </a:spcBef>
@@ -9066,7 +9186,7 @@
                     <a:bodyPr/>
                     <a:lstStyle/>
                     <a:p>
-                      <a:pPr indent="0" lvl="0" marL="0" rtl="0" algn="l">
+                      <a:pPr indent="0" lvl="0" marL="0" rtl="0" algn="r">
                         <a:spcBef>
                           <a:spcPts val="0"/>
                         </a:spcBef>
@@ -9089,7 +9209,7 @@
                     <a:bodyPr/>
                     <a:lstStyle/>
                     <a:p>
-                      <a:pPr indent="0" lvl="0" marL="0" rtl="0" algn="l">
+                      <a:pPr indent="0" lvl="0" marL="0" rtl="0" algn="r">
                         <a:spcBef>
                           <a:spcPts val="0"/>
                         </a:spcBef>
@@ -9114,14 +9234,14 @@
       </p:graphicFrame>
       <p:sp>
         <p:nvSpPr>
-          <p:cNvPr id="103" name="Google Shape;103;p19"/>
+          <p:cNvPr id="104" name="Google Shape;104;p19"/>
           <p:cNvSpPr txBox="1"/>
           <p:nvPr/>
         </p:nvSpPr>
         <p:spPr>
           <a:xfrm>
-            <a:off x="482075" y="3060075"/>
-            <a:ext cx="7188900" cy="2124000"/>
+            <a:off x="329675" y="3060075"/>
+            <a:ext cx="7188900" cy="1908600"/>
           </a:xfrm>
           <a:prstGeom prst="rect">
             <a:avLst/>
@@ -9153,7 +9273,7 @@
                 <a:cs typeface="Proxima Nova"/>
                 <a:sym typeface="Proxima Nova"/>
               </a:rPr>
-              <a:t>We chose BERT as the best performing model and used it to </a:t>
+              <a:t>We chose BERT as the final model and used it to </a:t>
             </a:r>
             <a:r>
               <a:rPr lang="en-GB">
@@ -9339,34 +9459,6 @@
             </a:endParaRPr>
           </a:p>
           <a:p>
-            <a:pPr indent="-317500" lvl="0" marL="457200" rtl="0" algn="l">
-              <a:spcBef>
-                <a:spcPts val="0"/>
-              </a:spcBef>
-              <a:spcAft>
-                <a:spcPts val="0"/>
-              </a:spcAft>
-              <a:buSzPts val="1400"/>
-              <a:buFont typeface="Proxima Nova"/>
-              <a:buChar char="-"/>
-            </a:pPr>
-            <a:r>
-              <a:rPr lang="en-GB">
-                <a:latin typeface="Proxima Nova"/>
-                <a:ea typeface="Proxima Nova"/>
-                <a:cs typeface="Proxima Nova"/>
-                <a:sym typeface="Proxima Nova"/>
-              </a:rPr>
-              <a:t>BCE Loss: 0.06</a:t>
-            </a:r>
-            <a:endParaRPr>
-              <a:latin typeface="Proxima Nova"/>
-              <a:ea typeface="Proxima Nova"/>
-              <a:cs typeface="Proxima Nova"/>
-              <a:sym typeface="Proxima Nova"/>
-            </a:endParaRPr>
-          </a:p>
-          <a:p>
             <a:pPr indent="0" lvl="0" marL="0" rtl="0" algn="l">
               <a:spcBef>
                 <a:spcPts val="0"/>
@@ -9401,7 +9493,7 @@
   <p:cSld>
     <p:spTree>
       <p:nvGrpSpPr>
-        <p:cNvPr id="107" name="Shape 107"/>
+        <p:cNvPr id="108" name="Shape 108"/>
         <p:cNvGrpSpPr/>
         <p:nvPr/>
       </p:nvGrpSpPr>
@@ -9415,7 +9507,7 @@
       </p:grpSpPr>
       <p:sp>
         <p:nvSpPr>
-          <p:cNvPr id="108" name="Google Shape;108;p20"/>
+          <p:cNvPr id="109" name="Google Shape;109;p20"/>
           <p:cNvSpPr txBox="1"/>
           <p:nvPr>
             <p:ph type="title"/>
@@ -9455,7 +9547,7 @@
       </p:sp>
       <p:graphicFrame>
         <p:nvGraphicFramePr>
-          <p:cNvPr id="109" name="Google Shape;109;p20"/>
+          <p:cNvPr id="110" name="Google Shape;110;p20"/>
           <p:cNvGraphicFramePr/>
           <p:nvPr/>
         </p:nvGraphicFramePr>
@@ -9468,14 +9560,14 @@
             <a:tbl>
               <a:tblPr>
                 <a:noFill/>
-                <a:tableStyleId>{78CAC0E2-35CB-44A0-879C-FBC3ACC6E584}</a:tableStyleId>
+                <a:tableStyleId>{4A715226-932A-4B2E-8F3D-F27B078A5E25}</a:tableStyleId>
               </a:tblPr>
               <a:tblGrid>
                 <a:gridCol w="1466800"/>
-                <a:gridCol w="985850"/>
-                <a:gridCol w="894200"/>
-                <a:gridCol w="871825"/>
-                <a:gridCol w="1565950"/>
+                <a:gridCol w="846475"/>
+                <a:gridCol w="697850"/>
+                <a:gridCol w="808500"/>
+                <a:gridCol w="825500"/>
               </a:tblGrid>
               <a:tr h="381000">
                 <a:tc>
@@ -9493,10 +9585,18 @@
                         <a:buNone/>
                       </a:pPr>
                       <a:r>
-                        <a:rPr b="1" lang="en-GB" sz="1100"/>
+                        <a:rPr b="1" lang="en-GB" sz="1100">
+                          <a:solidFill>
+                            <a:schemeClr val="lt1"/>
+                          </a:solidFill>
+                        </a:rPr>
                         <a:t>Labels</a:t>
                       </a:r>
-                      <a:endParaRPr b="1" sz="1100"/>
+                      <a:endParaRPr b="1" sz="1100">
+                        <a:solidFill>
+                          <a:schemeClr val="lt1"/>
+                        </a:solidFill>
+                      </a:endParaRPr>
                     </a:p>
                     <a:p>
                       <a:pPr indent="0" lvl="0" marL="0" rtl="0" algn="l">
@@ -9509,20 +9609,32 @@
                         <a:buNone/>
                       </a:pPr>
                       <a:r>
-                        <a:rPr b="1" lang="en-GB" sz="1100"/>
+                        <a:rPr b="1" lang="en-GB" sz="1100">
+                          <a:solidFill>
+                            <a:schemeClr val="lt1"/>
+                          </a:solidFill>
+                        </a:rPr>
                         <a:t>(Test)</a:t>
                       </a:r>
-                      <a:endParaRPr b="1" sz="1100"/>
+                      <a:endParaRPr b="1" sz="1100">
+                        <a:solidFill>
+                          <a:schemeClr val="lt1"/>
+                        </a:solidFill>
+                      </a:endParaRPr>
                     </a:p>
                   </a:txBody>
-                  <a:tcPr marT="91425" marB="91425" marR="91425" marL="91425"/>
+                  <a:tcPr marT="91425" marB="91425" marR="91425" marL="91425">
+                    <a:solidFill>
+                      <a:schemeClr val="lt2"/>
+                    </a:solidFill>
+                  </a:tcPr>
                 </a:tc>
                 <a:tc>
                   <a:txBody>
                     <a:bodyPr/>
                     <a:lstStyle/>
                     <a:p>
-                      <a:pPr indent="0" lvl="0" marL="0" rtl="0" algn="l">
+                      <a:pPr indent="0" lvl="0" marL="0" rtl="0" algn="r">
                         <a:spcBef>
                           <a:spcPts val="0"/>
                         </a:spcBef>
@@ -9532,20 +9644,32 @@
                         <a:buNone/>
                       </a:pPr>
                       <a:r>
-                        <a:rPr b="1" lang="en-GB" sz="1100"/>
+                        <a:rPr b="1" lang="en-GB" sz="1100">
+                          <a:solidFill>
+                            <a:schemeClr val="lt1"/>
+                          </a:solidFill>
+                        </a:rPr>
                         <a:t>Precision</a:t>
                       </a:r>
-                      <a:endParaRPr b="1" sz="1100"/>
+                      <a:endParaRPr b="1" sz="1100">
+                        <a:solidFill>
+                          <a:schemeClr val="lt1"/>
+                        </a:solidFill>
+                      </a:endParaRPr>
                     </a:p>
                   </a:txBody>
-                  <a:tcPr marT="91425" marB="91425" marR="91425" marL="91425"/>
+                  <a:tcPr marT="91425" marB="91425" marR="91425" marL="91425">
+                    <a:solidFill>
+                      <a:schemeClr val="lt2"/>
+                    </a:solidFill>
+                  </a:tcPr>
                 </a:tc>
                 <a:tc>
                   <a:txBody>
                     <a:bodyPr/>
                     <a:lstStyle/>
                     <a:p>
-                      <a:pPr indent="0" lvl="0" marL="0" rtl="0" algn="l">
+                      <a:pPr indent="0" lvl="0" marL="0" rtl="0" algn="r">
                         <a:spcBef>
                           <a:spcPts val="0"/>
                         </a:spcBef>
@@ -9555,20 +9679,32 @@
                         <a:buNone/>
                       </a:pPr>
                       <a:r>
-                        <a:rPr b="1" lang="en-GB" sz="1100"/>
+                        <a:rPr b="1" lang="en-GB" sz="1100">
+                          <a:solidFill>
+                            <a:schemeClr val="lt1"/>
+                          </a:solidFill>
+                        </a:rPr>
                         <a:t>Recall</a:t>
                       </a:r>
-                      <a:endParaRPr b="1" sz="1100"/>
+                      <a:endParaRPr b="1" sz="1100">
+                        <a:solidFill>
+                          <a:schemeClr val="lt1"/>
+                        </a:solidFill>
+                      </a:endParaRPr>
                     </a:p>
                   </a:txBody>
-                  <a:tcPr marT="91425" marB="91425" marR="91425" marL="91425"/>
+                  <a:tcPr marT="91425" marB="91425" marR="91425" marL="91425">
+                    <a:solidFill>
+                      <a:schemeClr val="lt2"/>
+                    </a:solidFill>
+                  </a:tcPr>
                 </a:tc>
                 <a:tc>
                   <a:txBody>
                     <a:bodyPr/>
                     <a:lstStyle/>
                     <a:p>
-                      <a:pPr indent="0" lvl="0" marL="0" rtl="0" algn="l">
+                      <a:pPr indent="0" lvl="0" marL="0" rtl="0" algn="r">
                         <a:spcBef>
                           <a:spcPts val="0"/>
                         </a:spcBef>
@@ -9578,24 +9714,40 @@
                         <a:buNone/>
                       </a:pPr>
                       <a:r>
-                        <a:rPr b="1" lang="en-GB" sz="1100"/>
+                        <a:rPr b="1" lang="en-GB" sz="1100">
+                          <a:solidFill>
+                            <a:schemeClr val="lt1"/>
+                          </a:solidFill>
+                        </a:rPr>
                         <a:t>F1-Score</a:t>
                       </a:r>
                       <a:r>
-                        <a:rPr b="1" lang="en-GB" sz="1100"/>
+                        <a:rPr b="1" lang="en-GB" sz="1100">
+                          <a:solidFill>
+                            <a:schemeClr val="lt1"/>
+                          </a:solidFill>
+                        </a:rPr>
                         <a:t> </a:t>
                       </a:r>
-                      <a:endParaRPr b="1" sz="1100"/>
+                      <a:endParaRPr b="1" sz="1100">
+                        <a:solidFill>
+                          <a:schemeClr val="lt1"/>
+                        </a:solidFill>
+                      </a:endParaRPr>
                     </a:p>
                   </a:txBody>
-                  <a:tcPr marT="91425" marB="91425" marR="91425" marL="91425"/>
+                  <a:tcPr marT="91425" marB="91425" marR="91425" marL="91425">
+                    <a:solidFill>
+                      <a:schemeClr val="lt2"/>
+                    </a:solidFill>
+                  </a:tcPr>
                 </a:tc>
                 <a:tc>
                   <a:txBody>
                     <a:bodyPr/>
                     <a:lstStyle/>
                     <a:p>
-                      <a:pPr indent="0" lvl="0" marL="0" rtl="0" algn="l">
+                      <a:pPr indent="0" lvl="0" marL="0" rtl="0" algn="r">
                         <a:spcBef>
                           <a:spcPts val="0"/>
                         </a:spcBef>
@@ -9605,13 +9757,25 @@
                         <a:buNone/>
                       </a:pPr>
                       <a:r>
-                        <a:rPr b="1" lang="en-GB" sz="1100"/>
+                        <a:rPr b="1" lang="en-GB" sz="1100">
+                          <a:solidFill>
+                            <a:schemeClr val="lt1"/>
+                          </a:solidFill>
+                        </a:rPr>
                         <a:t>Support</a:t>
                       </a:r>
-                      <a:endParaRPr b="1" sz="1100"/>
+                      <a:endParaRPr b="1" sz="1100">
+                        <a:solidFill>
+                          <a:schemeClr val="lt1"/>
+                        </a:solidFill>
+                      </a:endParaRPr>
                     </a:p>
                   </a:txBody>
-                  <a:tcPr marT="91425" marB="91425" marR="91425" marL="91425"/>
+                  <a:tcPr marT="91425" marB="91425" marR="91425" marL="91425">
+                    <a:solidFill>
+                      <a:schemeClr val="lt2"/>
+                    </a:solidFill>
+                  </a:tcPr>
                 </a:tc>
               </a:tr>
               <a:tr h="381000">
@@ -9643,7 +9807,7 @@
                     <a:bodyPr/>
                     <a:lstStyle/>
                     <a:p>
-                      <a:pPr indent="0" lvl="0" marL="0" rtl="0" algn="l">
+                      <a:pPr indent="0" lvl="0" marL="0" rtl="0" algn="r">
                         <a:spcBef>
                           <a:spcPts val="0"/>
                         </a:spcBef>
@@ -9666,7 +9830,7 @@
                     <a:bodyPr/>
                     <a:lstStyle/>
                     <a:p>
-                      <a:pPr indent="0" lvl="0" marL="0" rtl="0" algn="l">
+                      <a:pPr indent="0" lvl="0" marL="0" rtl="0" algn="r">
                         <a:spcBef>
                           <a:spcPts val="0"/>
                         </a:spcBef>
@@ -9689,7 +9853,7 @@
                     <a:bodyPr/>
                     <a:lstStyle/>
                     <a:p>
-                      <a:pPr indent="0" lvl="0" marL="0" rtl="0" algn="l">
+                      <a:pPr indent="0" lvl="0" marL="0" rtl="0" algn="r">
                         <a:spcBef>
                           <a:spcPts val="0"/>
                         </a:spcBef>
@@ -9712,7 +9876,7 @@
                     <a:bodyPr/>
                     <a:lstStyle/>
                     <a:p>
-                      <a:pPr indent="0" lvl="0" marL="0" rtl="0" algn="l">
+                      <a:pPr indent="0" lvl="0" marL="0" rtl="0" algn="r">
                         <a:spcBef>
                           <a:spcPts val="0"/>
                         </a:spcBef>
@@ -9760,7 +9924,7 @@
                     <a:bodyPr/>
                     <a:lstStyle/>
                     <a:p>
-                      <a:pPr indent="0" lvl="0" marL="0" rtl="0" algn="l">
+                      <a:pPr indent="0" lvl="0" marL="0" rtl="0" algn="r">
                         <a:spcBef>
                           <a:spcPts val="0"/>
                         </a:spcBef>
@@ -9783,7 +9947,7 @@
                     <a:bodyPr/>
                     <a:lstStyle/>
                     <a:p>
-                      <a:pPr indent="0" lvl="0" marL="0" rtl="0" algn="l">
+                      <a:pPr indent="0" lvl="0" marL="0" rtl="0" algn="r">
                         <a:spcBef>
                           <a:spcPts val="0"/>
                         </a:spcBef>
@@ -9806,7 +9970,7 @@
                     <a:bodyPr/>
                     <a:lstStyle/>
                     <a:p>
-                      <a:pPr indent="0" lvl="0" marL="0" rtl="0" algn="l">
+                      <a:pPr indent="0" lvl="0" marL="0" rtl="0" algn="r">
                         <a:spcBef>
                           <a:spcPts val="0"/>
                         </a:spcBef>
@@ -9829,7 +9993,7 @@
                     <a:bodyPr/>
                     <a:lstStyle/>
                     <a:p>
-                      <a:pPr indent="0" lvl="0" marL="0" rtl="0" algn="l">
+                      <a:pPr indent="0" lvl="0" marL="0" rtl="0" algn="r">
                         <a:spcBef>
                           <a:spcPts val="0"/>
                         </a:spcBef>
@@ -9877,7 +10041,7 @@
                     <a:bodyPr/>
                     <a:lstStyle/>
                     <a:p>
-                      <a:pPr indent="0" lvl="0" marL="0" rtl="0" algn="l">
+                      <a:pPr indent="0" lvl="0" marL="0" rtl="0" algn="r">
                         <a:spcBef>
                           <a:spcPts val="0"/>
                         </a:spcBef>
@@ -9900,7 +10064,7 @@
                     <a:bodyPr/>
                     <a:lstStyle/>
                     <a:p>
-                      <a:pPr indent="0" lvl="0" marL="0" rtl="0" algn="l">
+                      <a:pPr indent="0" lvl="0" marL="0" rtl="0" algn="r">
                         <a:spcBef>
                           <a:spcPts val="0"/>
                         </a:spcBef>
@@ -9923,7 +10087,7 @@
                     <a:bodyPr/>
                     <a:lstStyle/>
                     <a:p>
-                      <a:pPr indent="0" lvl="0" marL="0" rtl="0" algn="l">
+                      <a:pPr indent="0" lvl="0" marL="0" rtl="0" algn="r">
                         <a:spcBef>
                           <a:spcPts val="0"/>
                         </a:spcBef>
@@ -9946,7 +10110,7 @@
                     <a:bodyPr/>
                     <a:lstStyle/>
                     <a:p>
-                      <a:pPr indent="0" lvl="0" marL="0" rtl="0" algn="l">
+                      <a:pPr indent="0" lvl="0" marL="0" rtl="0" algn="r">
                         <a:spcBef>
                           <a:spcPts val="0"/>
                         </a:spcBef>
@@ -9994,7 +10158,7 @@
                     <a:bodyPr/>
                     <a:lstStyle/>
                     <a:p>
-                      <a:pPr indent="0" lvl="0" marL="0" rtl="0" algn="l">
+                      <a:pPr indent="0" lvl="0" marL="0" rtl="0" algn="r">
                         <a:spcBef>
                           <a:spcPts val="0"/>
                         </a:spcBef>
@@ -10017,7 +10181,7 @@
                     <a:bodyPr/>
                     <a:lstStyle/>
                     <a:p>
-                      <a:pPr indent="0" lvl="0" marL="0" rtl="0" algn="l">
+                      <a:pPr indent="0" lvl="0" marL="0" rtl="0" algn="r">
                         <a:spcBef>
                           <a:spcPts val="0"/>
                         </a:spcBef>
@@ -10040,7 +10204,7 @@
                     <a:bodyPr/>
                     <a:lstStyle/>
                     <a:p>
-                      <a:pPr indent="0" lvl="0" marL="0" rtl="0" algn="l">
+                      <a:pPr indent="0" lvl="0" marL="0" rtl="0" algn="r">
                         <a:spcBef>
                           <a:spcPts val="0"/>
                         </a:spcBef>
@@ -10063,7 +10227,7 @@
                     <a:bodyPr/>
                     <a:lstStyle/>
                     <a:p>
-                      <a:pPr indent="0" lvl="0" marL="0" rtl="0" algn="l">
+                      <a:pPr indent="0" lvl="0" marL="0" rtl="0" algn="r">
                         <a:spcBef>
                           <a:spcPts val="0"/>
                         </a:spcBef>
@@ -10111,7 +10275,7 @@
                     <a:bodyPr/>
                     <a:lstStyle/>
                     <a:p>
-                      <a:pPr indent="0" lvl="0" marL="0" rtl="0" algn="l">
+                      <a:pPr indent="0" lvl="0" marL="0" rtl="0" algn="r">
                         <a:spcBef>
                           <a:spcPts val="0"/>
                         </a:spcBef>
@@ -10134,7 +10298,7 @@
                     <a:bodyPr/>
                     <a:lstStyle/>
                     <a:p>
-                      <a:pPr indent="0" lvl="0" marL="0" rtl="0" algn="l">
+                      <a:pPr indent="0" lvl="0" marL="0" rtl="0" algn="r">
                         <a:spcBef>
                           <a:spcPts val="0"/>
                         </a:spcBef>
@@ -10157,7 +10321,7 @@
                     <a:bodyPr/>
                     <a:lstStyle/>
                     <a:p>
-                      <a:pPr indent="0" lvl="0" marL="0" rtl="0" algn="l">
+                      <a:pPr indent="0" lvl="0" marL="0" rtl="0" algn="r">
                         <a:spcBef>
                           <a:spcPts val="0"/>
                         </a:spcBef>
@@ -10180,7 +10344,7 @@
                     <a:bodyPr/>
                     <a:lstStyle/>
                     <a:p>
-                      <a:pPr indent="0" lvl="0" marL="0" rtl="0" algn="l">
+                      <a:pPr indent="0" lvl="0" marL="0" rtl="0" algn="r">
                         <a:spcBef>
                           <a:spcPts val="0"/>
                         </a:spcBef>
@@ -10199,7 +10363,7 @@
                   <a:tcPr marT="91425" marB="91425" marR="91425" marL="91425"/>
                 </a:tc>
               </a:tr>
-              <a:tr h="381000">
+              <a:tr h="100000">
                 <a:tc>
                   <a:txBody>
                     <a:bodyPr/>
@@ -10232,7 +10396,7 @@
                     <a:bodyPr/>
                     <a:lstStyle/>
                     <a:p>
-                      <a:pPr indent="0" lvl="0" marL="0" rtl="0" algn="l">
+                      <a:pPr indent="0" lvl="0" marL="0" rtl="0" algn="r">
                         <a:spcBef>
                           <a:spcPts val="0"/>
                         </a:spcBef>
@@ -10255,7 +10419,7 @@
                     <a:bodyPr/>
                     <a:lstStyle/>
                     <a:p>
-                      <a:pPr indent="0" lvl="0" marL="0" rtl="0" algn="l">
+                      <a:pPr indent="0" lvl="0" marL="0" rtl="0" algn="r">
                         <a:spcBef>
                           <a:spcPts val="0"/>
                         </a:spcBef>
@@ -10278,7 +10442,7 @@
                     <a:bodyPr/>
                     <a:lstStyle/>
                     <a:p>
-                      <a:pPr indent="0" lvl="0" marL="0" rtl="0" algn="l">
+                      <a:pPr indent="0" lvl="0" marL="0" rtl="0" algn="r">
                         <a:spcBef>
                           <a:spcPts val="0"/>
                         </a:spcBef>
@@ -10301,7 +10465,7 @@
                     <a:bodyPr/>
                     <a:lstStyle/>
                     <a:p>
-                      <a:pPr indent="0" lvl="0" marL="0" rtl="0" algn="l">
+                      <a:pPr indent="0" lvl="0" marL="0" rtl="0" algn="r">
                         <a:spcBef>
                           <a:spcPts val="0"/>
                         </a:spcBef>
@@ -10337,7 +10501,7 @@
   <p:cSld>
     <p:spTree>
       <p:nvGrpSpPr>
-        <p:cNvPr id="113" name="Shape 113"/>
+        <p:cNvPr id="114" name="Shape 114"/>
         <p:cNvGrpSpPr/>
         <p:nvPr/>
       </p:nvGrpSpPr>
@@ -10351,7 +10515,7 @@
       </p:grpSpPr>
       <p:sp>
         <p:nvSpPr>
-          <p:cNvPr id="114" name="Google Shape;114;p21"/>
+          <p:cNvPr id="115" name="Google Shape;115;p21"/>
           <p:cNvSpPr txBox="1"/>
           <p:nvPr>
             <p:ph type="ctrTitle"/>

</xml_diff>